<commit_message>
changes to the powerpoint images
</commit_message>
<xml_diff>
--- a/Air Pollution and Respiratory Diseases_TEMPLATE.pptx
+++ b/Air Pollution and Respiratory Diseases_TEMPLATE.pptx
@@ -108,7 +108,125 @@
       </a:defRPr>
     </a:lvl9pPr>
   </p:defaultTextStyle>
+  <p:extLst>
+    <p:ext uri="{EFAFB233-063F-42B5-8137-9DF3F51BA10A}">
+      <p15:sldGuideLst xmlns:p15="http://schemas.microsoft.com/office/powerpoint/2012/main"/>
+    </p:ext>
+  </p:extLst>
 </p:presentation>
+</file>
+
+<file path=ppt/changesInfos/changesInfo1.xml><?xml version="1.0" encoding="utf-8"?>
+<pc:chgInfo xmlns:a="http://schemas.openxmlformats.org/drawingml/2006/main" xmlns:r="http://schemas.openxmlformats.org/officeDocument/2006/relationships" xmlns:ac="http://schemas.microsoft.com/office/drawing/2013/main/command" xmlns:pc="http://schemas.microsoft.com/office/powerpoint/2013/main/command">
+  <pc:docChgLst>
+    <pc:chgData name="Loraine gomez" userId="34cb3af7fb3f3f24" providerId="LiveId" clId="{C498CDB4-6168-4151-A0AA-A463163AF081}"/>
+    <pc:docChg chg="undo custSel modSld sldOrd">
+      <pc:chgData name="Loraine gomez" userId="34cb3af7fb3f3f24" providerId="LiveId" clId="{C498CDB4-6168-4151-A0AA-A463163AF081}" dt="2022-10-17T01:05:45.043" v="210" actId="20577"/>
+      <pc:docMkLst>
+        <pc:docMk/>
+      </pc:docMkLst>
+      <pc:sldChg chg="addSp modSp mod">
+        <pc:chgData name="Loraine gomez" userId="34cb3af7fb3f3f24" providerId="LiveId" clId="{C498CDB4-6168-4151-A0AA-A463163AF081}" dt="2022-10-17T01:05:45.043" v="210" actId="20577"/>
+        <pc:sldMkLst>
+          <pc:docMk/>
+          <pc:sldMk cId="251404250" sldId="256"/>
+        </pc:sldMkLst>
+        <pc:spChg chg="mod">
+          <ac:chgData name="Loraine gomez" userId="34cb3af7fb3f3f24" providerId="LiveId" clId="{C498CDB4-6168-4151-A0AA-A463163AF081}" dt="2022-10-17T01:05:45.043" v="210" actId="20577"/>
+          <ac:spMkLst>
+            <pc:docMk/>
+            <pc:sldMk cId="251404250" sldId="256"/>
+            <ac:spMk id="2" creationId="{79EC64A7-12E3-7D7D-9CF3-093BCE2782F4}"/>
+          </ac:spMkLst>
+        </pc:spChg>
+        <pc:spChg chg="add mod">
+          <ac:chgData name="Loraine gomez" userId="34cb3af7fb3f3f24" providerId="LiveId" clId="{C498CDB4-6168-4151-A0AA-A463163AF081}" dt="2022-10-17T00:58:52.642" v="204" actId="20577"/>
+          <ac:spMkLst>
+            <pc:docMk/>
+            <pc:sldMk cId="251404250" sldId="256"/>
+            <ac:spMk id="3" creationId="{D92335C7-E99F-8D00-06C9-C8E541C79E90}"/>
+          </ac:spMkLst>
+        </pc:spChg>
+      </pc:sldChg>
+      <pc:sldChg chg="addSp delSp modSp mod ord">
+        <pc:chgData name="Loraine gomez" userId="34cb3af7fb3f3f24" providerId="LiveId" clId="{C498CDB4-6168-4151-A0AA-A463163AF081}" dt="2022-10-17T00:44:14.363" v="94" actId="1076"/>
+        <pc:sldMkLst>
+          <pc:docMk/>
+          <pc:sldMk cId="2664259636" sldId="257"/>
+        </pc:sldMkLst>
+        <pc:spChg chg="mod">
+          <ac:chgData name="Loraine gomez" userId="34cb3af7fb3f3f24" providerId="LiveId" clId="{C498CDB4-6168-4151-A0AA-A463163AF081}" dt="2022-10-17T00:44:14.363" v="94" actId="1076"/>
+          <ac:spMkLst>
+            <pc:docMk/>
+            <pc:sldMk cId="2664259636" sldId="257"/>
+            <ac:spMk id="4" creationId="{20699468-C82A-0A24-EDDC-2C9FB07262FF}"/>
+          </ac:spMkLst>
+        </pc:spChg>
+        <pc:picChg chg="del">
+          <ac:chgData name="Loraine gomez" userId="34cb3af7fb3f3f24" providerId="LiveId" clId="{C498CDB4-6168-4151-A0AA-A463163AF081}" dt="2022-10-16T23:35:50.033" v="86" actId="21"/>
+          <ac:picMkLst>
+            <pc:docMk/>
+            <pc:sldMk cId="2664259636" sldId="257"/>
+            <ac:picMk id="3" creationId="{3FBF49B3-AE7A-7318-6F5E-B18DA3C11A75}"/>
+          </ac:picMkLst>
+        </pc:picChg>
+        <pc:picChg chg="add mod">
+          <ac:chgData name="Loraine gomez" userId="34cb3af7fb3f3f24" providerId="LiveId" clId="{C498CDB4-6168-4151-A0AA-A463163AF081}" dt="2022-10-16T23:54:11.686" v="91" actId="14100"/>
+          <ac:picMkLst>
+            <pc:docMk/>
+            <pc:sldMk cId="2664259636" sldId="257"/>
+            <ac:picMk id="5" creationId="{E64EBC9C-AB46-DCF9-049E-953EDA339D09}"/>
+          </ac:picMkLst>
+        </pc:picChg>
+      </pc:sldChg>
+      <pc:sldChg chg="addSp delSp mod">
+        <pc:chgData name="Loraine gomez" userId="34cb3af7fb3f3f24" providerId="LiveId" clId="{C498CDB4-6168-4151-A0AA-A463163AF081}" dt="2022-10-17T00:53:04.681" v="96" actId="478"/>
+        <pc:sldMkLst>
+          <pc:docMk/>
+          <pc:sldMk cId="3453294101" sldId="258"/>
+        </pc:sldMkLst>
+        <pc:picChg chg="add del">
+          <ac:chgData name="Loraine gomez" userId="34cb3af7fb3f3f24" providerId="LiveId" clId="{C498CDB4-6168-4151-A0AA-A463163AF081}" dt="2022-10-17T00:53:04.681" v="96" actId="478"/>
+          <ac:picMkLst>
+            <pc:docMk/>
+            <pc:sldMk cId="3453294101" sldId="258"/>
+            <ac:picMk id="3" creationId="{C4B7F4EB-3773-6EBC-938E-6ADBBB5FC4AB}"/>
+          </ac:picMkLst>
+        </pc:picChg>
+      </pc:sldChg>
+      <pc:sldChg chg="modSp mod">
+        <pc:chgData name="Loraine gomez" userId="34cb3af7fb3f3f24" providerId="LiveId" clId="{C498CDB4-6168-4151-A0AA-A463163AF081}" dt="2022-10-16T08:26:47.700" v="65" actId="20577"/>
+        <pc:sldMkLst>
+          <pc:docMk/>
+          <pc:sldMk cId="3122610346" sldId="259"/>
+        </pc:sldMkLst>
+        <pc:spChg chg="mod">
+          <ac:chgData name="Loraine gomez" userId="34cb3af7fb3f3f24" providerId="LiveId" clId="{C498CDB4-6168-4151-A0AA-A463163AF081}" dt="2022-10-16T08:26:47.700" v="65" actId="20577"/>
+          <ac:spMkLst>
+            <pc:docMk/>
+            <pc:sldMk cId="3122610346" sldId="259"/>
+            <ac:spMk id="4" creationId="{5EADE604-B5EC-537E-AD7C-DA30EBC2641D}"/>
+          </ac:spMkLst>
+        </pc:spChg>
+      </pc:sldChg>
+      <pc:sldChg chg="modSp mod">
+        <pc:chgData name="Loraine gomez" userId="34cb3af7fb3f3f24" providerId="LiveId" clId="{C498CDB4-6168-4151-A0AA-A463163AF081}" dt="2022-10-16T23:23:21.520" v="85" actId="20577"/>
+        <pc:sldMkLst>
+          <pc:docMk/>
+          <pc:sldMk cId="3895599169" sldId="260"/>
+        </pc:sldMkLst>
+        <pc:spChg chg="mod">
+          <ac:chgData name="Loraine gomez" userId="34cb3af7fb3f3f24" providerId="LiveId" clId="{C498CDB4-6168-4151-A0AA-A463163AF081}" dt="2022-10-16T23:23:21.520" v="85" actId="20577"/>
+          <ac:spMkLst>
+            <pc:docMk/>
+            <pc:sldMk cId="3895599169" sldId="260"/>
+            <ac:spMk id="4" creationId="{59DF2F12-7FD3-9879-AF09-1413386DBF57}"/>
+          </ac:spMkLst>
+        </pc:spChg>
+      </pc:sldChg>
+    </pc:docChg>
+  </pc:docChgLst>
+</pc:chgInfo>
 </file>
 
 <file path=ppt/slideLayouts/slideLayout1.xml><?xml version="1.0" encoding="utf-8"?>
@@ -258,7 +376,7 @@
           <a:p>
             <a:fld id="{3FBFAB8F-4CC6-4143-8538-FA2282C3F276}" type="datetimeFigureOut">
               <a:rPr lang="en-US" smtClean="0"/>
-              <a:t>10/14/2022</a:t>
+              <a:t>10/16/2022</a:t>
             </a:fld>
             <a:endParaRPr lang="en-US"/>
           </a:p>
@@ -456,7 +574,7 @@
           <a:p>
             <a:fld id="{3FBFAB8F-4CC6-4143-8538-FA2282C3F276}" type="datetimeFigureOut">
               <a:rPr lang="en-US" smtClean="0"/>
-              <a:t>10/14/2022</a:t>
+              <a:t>10/16/2022</a:t>
             </a:fld>
             <a:endParaRPr lang="en-US"/>
           </a:p>
@@ -664,7 +782,7 @@
           <a:p>
             <a:fld id="{3FBFAB8F-4CC6-4143-8538-FA2282C3F276}" type="datetimeFigureOut">
               <a:rPr lang="en-US" smtClean="0"/>
-              <a:t>10/14/2022</a:t>
+              <a:t>10/16/2022</a:t>
             </a:fld>
             <a:endParaRPr lang="en-US"/>
           </a:p>
@@ -862,7 +980,7 @@
           <a:p>
             <a:fld id="{3FBFAB8F-4CC6-4143-8538-FA2282C3F276}" type="datetimeFigureOut">
               <a:rPr lang="en-US" smtClean="0"/>
-              <a:t>10/14/2022</a:t>
+              <a:t>10/16/2022</a:t>
             </a:fld>
             <a:endParaRPr lang="en-US"/>
           </a:p>
@@ -1137,7 +1255,7 @@
           <a:p>
             <a:fld id="{3FBFAB8F-4CC6-4143-8538-FA2282C3F276}" type="datetimeFigureOut">
               <a:rPr lang="en-US" smtClean="0"/>
-              <a:t>10/14/2022</a:t>
+              <a:t>10/16/2022</a:t>
             </a:fld>
             <a:endParaRPr lang="en-US"/>
           </a:p>
@@ -1402,7 +1520,7 @@
           <a:p>
             <a:fld id="{3FBFAB8F-4CC6-4143-8538-FA2282C3F276}" type="datetimeFigureOut">
               <a:rPr lang="en-US" smtClean="0"/>
-              <a:t>10/14/2022</a:t>
+              <a:t>10/16/2022</a:t>
             </a:fld>
             <a:endParaRPr lang="en-US"/>
           </a:p>
@@ -1814,7 +1932,7 @@
           <a:p>
             <a:fld id="{3FBFAB8F-4CC6-4143-8538-FA2282C3F276}" type="datetimeFigureOut">
               <a:rPr lang="en-US" smtClean="0"/>
-              <a:t>10/14/2022</a:t>
+              <a:t>10/16/2022</a:t>
             </a:fld>
             <a:endParaRPr lang="en-US"/>
           </a:p>
@@ -1955,7 +2073,7 @@
           <a:p>
             <a:fld id="{3FBFAB8F-4CC6-4143-8538-FA2282C3F276}" type="datetimeFigureOut">
               <a:rPr lang="en-US" smtClean="0"/>
-              <a:t>10/14/2022</a:t>
+              <a:t>10/16/2022</a:t>
             </a:fld>
             <a:endParaRPr lang="en-US"/>
           </a:p>
@@ -2068,7 +2186,7 @@
           <a:p>
             <a:fld id="{3FBFAB8F-4CC6-4143-8538-FA2282C3F276}" type="datetimeFigureOut">
               <a:rPr lang="en-US" smtClean="0"/>
-              <a:t>10/14/2022</a:t>
+              <a:t>10/16/2022</a:t>
             </a:fld>
             <a:endParaRPr lang="en-US"/>
           </a:p>
@@ -2379,7 +2497,7 @@
           <a:p>
             <a:fld id="{3FBFAB8F-4CC6-4143-8538-FA2282C3F276}" type="datetimeFigureOut">
               <a:rPr lang="en-US" smtClean="0"/>
-              <a:t>10/14/2022</a:t>
+              <a:t>10/16/2022</a:t>
             </a:fld>
             <a:endParaRPr lang="en-US"/>
           </a:p>
@@ -2667,7 +2785,7 @@
           <a:p>
             <a:fld id="{3FBFAB8F-4CC6-4143-8538-FA2282C3F276}" type="datetimeFigureOut">
               <a:rPr lang="en-US" smtClean="0"/>
-              <a:t>10/14/2022</a:t>
+              <a:t>10/16/2022</a:t>
             </a:fld>
             <a:endParaRPr lang="en-US"/>
           </a:p>
@@ -2908,7 +3026,7 @@
           <a:p>
             <a:fld id="{3FBFAB8F-4CC6-4143-8538-FA2282C3F276}" type="datetimeFigureOut">
               <a:rPr lang="en-US" smtClean="0"/>
-              <a:t>10/14/2022</a:t>
+              <a:t>10/16/2022</a:t>
             </a:fld>
             <a:endParaRPr lang="en-US"/>
           </a:p>
@@ -3376,6 +3494,45 @@
           </a:p>
         </p:txBody>
       </p:sp>
+      <p:sp>
+        <p:nvSpPr>
+          <p:cNvPr id="3" name="TextBox 2">
+            <a:extLst>
+              <a:ext uri="{FF2B5EF4-FFF2-40B4-BE49-F238E27FC236}">
+                <a16:creationId xmlns:a16="http://schemas.microsoft.com/office/drawing/2014/main" id="{D92335C7-E99F-8D00-06C9-C8E541C79E90}"/>
+              </a:ext>
+            </a:extLst>
+          </p:cNvPr>
+          <p:cNvSpPr txBox="1"/>
+          <p:nvPr/>
+        </p:nvSpPr>
+        <p:spPr>
+          <a:xfrm>
+            <a:off x="1778466" y="2944536"/>
+            <a:ext cx="9504727" cy="369332"/>
+          </a:xfrm>
+          <a:prstGeom prst="rect">
+            <a:avLst/>
+          </a:prstGeom>
+          <a:noFill/>
+        </p:spPr>
+        <p:txBody>
+          <a:bodyPr wrap="square" rtlCol="0">
+            <a:spAutoFit/>
+          </a:bodyPr>
+          <a:lstStyle/>
+          <a:p>
+            <a:r>
+              <a:rPr lang="en-US" dirty="0">
+                <a:solidFill>
+                  <a:schemeClr val="bg1"/>
+                </a:solidFill>
+              </a:rPr>
+              <a:t>GROUP MEMBERS: Jessica E, Ariana G, Loraine G, Paul S,  Deborah D</a:t>
+            </a:r>
+          </a:p>
+        </p:txBody>
+      </p:sp>
     </p:spTree>
     <p:extLst>
       <p:ext uri="{BB962C8B-B14F-4D97-AF65-F5344CB8AC3E}">
@@ -3428,7 +3585,7 @@
         </p:nvSpPr>
         <p:spPr>
           <a:xfrm>
-            <a:off x="648931" y="2438400"/>
+            <a:off x="484214" y="1093813"/>
             <a:ext cx="3505494" cy="3785419"/>
           </a:xfrm>
           <a:prstGeom prst="rect">
@@ -3452,7 +3609,7 @@
               <a:buChar char="•"/>
             </a:pPr>
             <a:r>
-              <a:rPr lang="en-US" sz="2000"/>
+              <a:rPr lang="en-US" sz="2000" dirty="0"/>
               <a:t>Home Page:</a:t>
             </a:r>
           </a:p>
@@ -3468,7 +3625,7 @@
               <a:buChar char="•"/>
             </a:pPr>
             <a:r>
-              <a:rPr lang="en-US" sz="2000"/>
+              <a:rPr lang="en-US" sz="2000" dirty="0"/>
               <a:t>Gives a brief description of the respiratory illnesses and diseases that can be caused by air pollution. </a:t>
             </a:r>
           </a:p>
@@ -3484,7 +3641,7 @@
               <a:buChar char="•"/>
             </a:pPr>
             <a:r>
-              <a:rPr lang="en-US" sz="2000"/>
+              <a:rPr lang="en-US" sz="2000" dirty="0"/>
               <a:t>Nav Bar will take you to various charts.</a:t>
             </a:r>
           </a:p>
@@ -3629,10 +3786,10 @@
       </p:sp>
       <p:pic>
         <p:nvPicPr>
-          <p:cNvPr id="3" name="Picture 2">
-            <a:extLst>
-              <a:ext uri="{FF2B5EF4-FFF2-40B4-BE49-F238E27FC236}">
-                <a16:creationId xmlns:a16="http://schemas.microsoft.com/office/drawing/2014/main" id="{3FBF49B3-AE7A-7318-6F5E-B18DA3C11A75}"/>
+          <p:cNvPr id="5" name="Picture 4">
+            <a:extLst>
+              <a:ext uri="{FF2B5EF4-FFF2-40B4-BE49-F238E27FC236}">
+                <a16:creationId xmlns:a16="http://schemas.microsoft.com/office/drawing/2014/main" id="{E64EBC9C-AB46-DCF9-049E-953EDA339D09}"/>
               </a:ext>
             </a:extLst>
           </p:cNvPr>
@@ -3642,20 +3799,25 @@
           <p:nvPr/>
         </p:nvPicPr>
         <p:blipFill>
-          <a:blip r:embed="rId2"/>
+          <a:blip r:embed="rId2">
+            <a:extLst>
+              <a:ext uri="{28A0092B-C50C-407E-A947-70E740481C1C}">
+                <a14:useLocalDpi xmlns:a14="http://schemas.microsoft.com/office/drawing/2010/main" val="0"/>
+              </a:ext>
+            </a:extLst>
+          </a:blip>
           <a:stretch>
             <a:fillRect/>
           </a:stretch>
         </p:blipFill>
         <p:spPr>
           <a:xfrm>
-            <a:off x="5405862" y="1892448"/>
-            <a:ext cx="6019331" cy="3069858"/>
+            <a:off x="5123688" y="1635853"/>
+            <a:ext cx="6584098" cy="3674378"/>
           </a:xfrm>
           <a:prstGeom prst="rect">
             <a:avLst/>
           </a:prstGeom>
-          <a:effectLst/>
         </p:spPr>
       </p:pic>
     </p:spTree>
@@ -3991,8 +4153,8 @@
               <a:buChar char="•"/>
             </a:pPr>
             <a:r>
-              <a:rPr lang="en-US" sz="2400"/>
-              <a:t>The Heatmaps menu item will take the user to the map of the USA displaying where air quality is being measured? ? </a:t>
+              <a:rPr lang="en-US" sz="2400" dirty="0"/>
+              <a:t>The Heatmaps menu item will take the user to the map of the USA displaying where air quality is located and the measurement.</a:t>
             </a:r>
           </a:p>
         </p:txBody>
@@ -4241,8 +4403,16 @@
               <a:buChar char="•"/>
             </a:pPr>
             <a:r>
-              <a:rPr lang="en-US" sz="2000"/>
-              <a:t>The Death Charts! Menu option redirects to a plotly chart that displays the count of all respiratory deaths in a selected year within a selected state.</a:t>
+              <a:rPr lang="en-US" sz="2000" dirty="0"/>
+              <a:t>The ! Menu option redirects to a </a:t>
+            </a:r>
+            <a:r>
+              <a:rPr lang="en-US" sz="2000" dirty="0" err="1"/>
+              <a:t>Plotly</a:t>
+            </a:r>
+            <a:r>
+              <a:rPr lang="en-US" sz="2000" dirty="0"/>
+              <a:t> chart that displays the count of all respiratory deaths in a selected year within a selected state.</a:t>
             </a:r>
           </a:p>
         </p:txBody>

</xml_diff>

<commit_message>
Added Slide to Powerpoint, and Edit all texts
</commit_message>
<xml_diff>
--- a/Air Pollution and Respiratory Diseases_TEMPLATE.pptx
+++ b/Air Pollution and Respiratory Diseases_TEMPLATE.pptx
@@ -10,6 +10,8 @@
     <p:sldId id="258" r:id="rId4"/>
     <p:sldId id="259" r:id="rId5"/>
     <p:sldId id="260" r:id="rId6"/>
+    <p:sldId id="263" r:id="rId7"/>
+    <p:sldId id="264" r:id="rId8"/>
   </p:sldIdLst>
   <p:sldSz cx="12192000" cy="6858000"/>
   <p:notesSz cx="6858000" cy="9144000"/>
@@ -120,13 +122,13 @@
 <pc:chgInfo xmlns:a="http://schemas.openxmlformats.org/drawingml/2006/main" xmlns:r="http://schemas.openxmlformats.org/officeDocument/2006/relationships" xmlns:ac="http://schemas.microsoft.com/office/drawing/2013/main/command" xmlns:pc="http://schemas.microsoft.com/office/powerpoint/2013/main/command">
   <pc:docChgLst>
     <pc:chgData name="Loraine gomez" userId="34cb3af7fb3f3f24" providerId="LiveId" clId="{C498CDB4-6168-4151-A0AA-A463163AF081}"/>
-    <pc:docChg chg="undo custSel modSld sldOrd">
-      <pc:chgData name="Loraine gomez" userId="34cb3af7fb3f3f24" providerId="LiveId" clId="{C498CDB4-6168-4151-A0AA-A463163AF081}" dt="2022-10-17T01:05:45.043" v="210" actId="20577"/>
+    <pc:docChg chg="undo redo custSel addSld delSld modSld sldOrd">
+      <pc:chgData name="Loraine gomez" userId="34cb3af7fb3f3f24" providerId="LiveId" clId="{C498CDB4-6168-4151-A0AA-A463163AF081}" dt="2022-10-17T05:49:01.009" v="1277" actId="20577"/>
       <pc:docMkLst>
         <pc:docMk/>
       </pc:docMkLst>
-      <pc:sldChg chg="addSp modSp mod">
-        <pc:chgData name="Loraine gomez" userId="34cb3af7fb3f3f24" providerId="LiveId" clId="{C498CDB4-6168-4151-A0AA-A463163AF081}" dt="2022-10-17T01:05:45.043" v="210" actId="20577"/>
+      <pc:sldChg chg="addSp modSp mod modTransition">
+        <pc:chgData name="Loraine gomez" userId="34cb3af7fb3f3f24" providerId="LiveId" clId="{C498CDB4-6168-4151-A0AA-A463163AF081}" dt="2022-10-17T05:27:10.888" v="1183"/>
         <pc:sldMkLst>
           <pc:docMk/>
           <pc:sldMk cId="251404250" sldId="256"/>
@@ -148,18 +150,58 @@
           </ac:spMkLst>
         </pc:spChg>
       </pc:sldChg>
-      <pc:sldChg chg="addSp delSp modSp mod ord">
-        <pc:chgData name="Loraine gomez" userId="34cb3af7fb3f3f24" providerId="LiveId" clId="{C498CDB4-6168-4151-A0AA-A463163AF081}" dt="2022-10-17T00:44:14.363" v="94" actId="1076"/>
+      <pc:sldChg chg="addSp delSp modSp mod ord modTransition modClrScheme delDesignElem chgLayout">
+        <pc:chgData name="Loraine gomez" userId="34cb3af7fb3f3f24" providerId="LiveId" clId="{C498CDB4-6168-4151-A0AA-A463163AF081}" dt="2022-10-17T05:27:48.976" v="1192"/>
         <pc:sldMkLst>
           <pc:docMk/>
           <pc:sldMk cId="2664259636" sldId="257"/>
         </pc:sldMkLst>
+        <pc:spChg chg="add del mod ord">
+          <ac:chgData name="Loraine gomez" userId="34cb3af7fb3f3f24" providerId="LiveId" clId="{C498CDB4-6168-4151-A0AA-A463163AF081}" dt="2022-10-17T01:54:45.648" v="230" actId="700"/>
+          <ac:spMkLst>
+            <pc:docMk/>
+            <pc:sldMk cId="2664259636" sldId="257"/>
+            <ac:spMk id="2" creationId="{AF57ED4E-BCD6-1797-2C31-4CAE2FA82C8E}"/>
+          </ac:spMkLst>
+        </pc:spChg>
+        <pc:spChg chg="add del mod ord">
+          <ac:chgData name="Loraine gomez" userId="34cb3af7fb3f3f24" providerId="LiveId" clId="{C498CDB4-6168-4151-A0AA-A463163AF081}" dt="2022-10-17T01:54:45.648" v="230" actId="700"/>
+          <ac:spMkLst>
+            <pc:docMk/>
+            <pc:sldMk cId="2664259636" sldId="257"/>
+            <ac:spMk id="3" creationId="{EA5570F3-B4F2-9556-4B9A-6F51292D8243}"/>
+          </ac:spMkLst>
+        </pc:spChg>
         <pc:spChg chg="mod">
-          <ac:chgData name="Loraine gomez" userId="34cb3af7fb3f3f24" providerId="LiveId" clId="{C498CDB4-6168-4151-A0AA-A463163AF081}" dt="2022-10-17T00:44:14.363" v="94" actId="1076"/>
+          <ac:chgData name="Loraine gomez" userId="34cb3af7fb3f3f24" providerId="LiveId" clId="{C498CDB4-6168-4151-A0AA-A463163AF081}" dt="2022-10-17T04:44:25.028" v="486" actId="20577"/>
           <ac:spMkLst>
             <pc:docMk/>
             <pc:sldMk cId="2664259636" sldId="257"/>
             <ac:spMk id="4" creationId="{20699468-C82A-0A24-EDDC-2C9FB07262FF}"/>
+          </ac:spMkLst>
+        </pc:spChg>
+        <pc:spChg chg="add del mod ord">
+          <ac:chgData name="Loraine gomez" userId="34cb3af7fb3f3f24" providerId="LiveId" clId="{C498CDB4-6168-4151-A0AA-A463163AF081}" dt="2022-10-17T01:54:45.648" v="230" actId="700"/>
+          <ac:spMkLst>
+            <pc:docMk/>
+            <pc:sldMk cId="2664259636" sldId="257"/>
+            <ac:spMk id="6" creationId="{82575DBB-1BF6-8D15-BFEA-6D5C44B9879B}"/>
+          </ac:spMkLst>
+        </pc:spChg>
+        <pc:spChg chg="add del">
+          <ac:chgData name="Loraine gomez" userId="34cb3af7fb3f3f24" providerId="LiveId" clId="{C498CDB4-6168-4151-A0AA-A463163AF081}" dt="2022-10-17T01:56:08.453" v="233" actId="700"/>
+          <ac:spMkLst>
+            <pc:docMk/>
+            <pc:sldMk cId="2664259636" sldId="257"/>
+            <ac:spMk id="16" creationId="{5E39A796-BE83-48B1-B33F-35C4A32AAB57}"/>
+          </ac:spMkLst>
+        </pc:spChg>
+        <pc:spChg chg="add del">
+          <ac:chgData name="Loraine gomez" userId="34cb3af7fb3f3f24" providerId="LiveId" clId="{C498CDB4-6168-4151-A0AA-A463163AF081}" dt="2022-10-17T01:56:08.453" v="233" actId="700"/>
+          <ac:spMkLst>
+            <pc:docMk/>
+            <pc:sldMk cId="2664259636" sldId="257"/>
+            <ac:spMk id="18" creationId="{72F84B47-E267-4194-8194-831DB7B5547F}"/>
           </ac:spMkLst>
         </pc:spChg>
         <pc:picChg chg="del">
@@ -179,29 +221,53 @@
           </ac:picMkLst>
         </pc:picChg>
       </pc:sldChg>
-      <pc:sldChg chg="addSp delSp mod">
-        <pc:chgData name="Loraine gomez" userId="34cb3af7fb3f3f24" providerId="LiveId" clId="{C498CDB4-6168-4151-A0AA-A463163AF081}" dt="2022-10-17T00:53:04.681" v="96" actId="478"/>
+      <pc:sldChg chg="addSp delSp modSp mod modTransition">
+        <pc:chgData name="Loraine gomez" userId="34cb3af7fb3f3f24" providerId="LiveId" clId="{C498CDB4-6168-4151-A0AA-A463163AF081}" dt="2022-10-17T05:27:53.538" v="1193"/>
         <pc:sldMkLst>
           <pc:docMk/>
           <pc:sldMk cId="3453294101" sldId="258"/>
         </pc:sldMkLst>
+        <pc:spChg chg="mod">
+          <ac:chgData name="Loraine gomez" userId="34cb3af7fb3f3f24" providerId="LiveId" clId="{C498CDB4-6168-4151-A0AA-A463163AF081}" dt="2022-10-17T04:44:59.041" v="489" actId="20577"/>
+          <ac:spMkLst>
+            <pc:docMk/>
+            <pc:sldMk cId="3453294101" sldId="258"/>
+            <ac:spMk id="4" creationId="{DEAF9B91-255F-A44E-1F0D-51EB20789024}"/>
+          </ac:spMkLst>
+        </pc:spChg>
         <pc:picChg chg="add del">
-          <ac:chgData name="Loraine gomez" userId="34cb3af7fb3f3f24" providerId="LiveId" clId="{C498CDB4-6168-4151-A0AA-A463163AF081}" dt="2022-10-17T00:53:04.681" v="96" actId="478"/>
+          <ac:chgData name="Loraine gomez" userId="34cb3af7fb3f3f24" providerId="LiveId" clId="{C498CDB4-6168-4151-A0AA-A463163AF081}" dt="2022-10-17T01:34:58.795" v="211" actId="478"/>
           <ac:picMkLst>
             <pc:docMk/>
             <pc:sldMk cId="3453294101" sldId="258"/>
             <ac:picMk id="3" creationId="{C4B7F4EB-3773-6EBC-938E-6ADBBB5FC4AB}"/>
           </ac:picMkLst>
         </pc:picChg>
+        <pc:picChg chg="add del mod">
+          <ac:chgData name="Loraine gomez" userId="34cb3af7fb3f3f24" providerId="LiveId" clId="{C498CDB4-6168-4151-A0AA-A463163AF081}" dt="2022-10-17T01:35:22.560" v="214" actId="478"/>
+          <ac:picMkLst>
+            <pc:docMk/>
+            <pc:sldMk cId="3453294101" sldId="258"/>
+            <ac:picMk id="5" creationId="{40B895F2-9868-C29D-1AF2-CD79B0448244}"/>
+          </ac:picMkLst>
+        </pc:picChg>
+        <pc:picChg chg="add mod">
+          <ac:chgData name="Loraine gomez" userId="34cb3af7fb3f3f24" providerId="LiveId" clId="{C498CDB4-6168-4151-A0AA-A463163AF081}" dt="2022-10-17T04:55:18.260" v="745" actId="14100"/>
+          <ac:picMkLst>
+            <pc:docMk/>
+            <pc:sldMk cId="3453294101" sldId="258"/>
+            <ac:picMk id="7" creationId="{503BCA71-B547-463E-94DC-FC0CAEEE44EF}"/>
+          </ac:picMkLst>
+        </pc:picChg>
       </pc:sldChg>
-      <pc:sldChg chg="modSp mod">
-        <pc:chgData name="Loraine gomez" userId="34cb3af7fb3f3f24" providerId="LiveId" clId="{C498CDB4-6168-4151-A0AA-A463163AF081}" dt="2022-10-16T08:26:47.700" v="65" actId="20577"/>
+      <pc:sldChg chg="modSp mod modTransition">
+        <pc:chgData name="Loraine gomez" userId="34cb3af7fb3f3f24" providerId="LiveId" clId="{C498CDB4-6168-4151-A0AA-A463163AF081}" dt="2022-10-17T05:27:57.604" v="1194"/>
         <pc:sldMkLst>
           <pc:docMk/>
           <pc:sldMk cId="3122610346" sldId="259"/>
         </pc:sldMkLst>
         <pc:spChg chg="mod">
-          <ac:chgData name="Loraine gomez" userId="34cb3af7fb3f3f24" providerId="LiveId" clId="{C498CDB4-6168-4151-A0AA-A463163AF081}" dt="2022-10-16T08:26:47.700" v="65" actId="20577"/>
+          <ac:chgData name="Loraine gomez" userId="34cb3af7fb3f3f24" providerId="LiveId" clId="{C498CDB4-6168-4151-A0AA-A463163AF081}" dt="2022-10-17T04:51:36.216" v="680" actId="20577"/>
           <ac:spMkLst>
             <pc:docMk/>
             <pc:sldMk cId="3122610346" sldId="259"/>
@@ -209,20 +275,248 @@
           </ac:spMkLst>
         </pc:spChg>
       </pc:sldChg>
-      <pc:sldChg chg="modSp mod">
-        <pc:chgData name="Loraine gomez" userId="34cb3af7fb3f3f24" providerId="LiveId" clId="{C498CDB4-6168-4151-A0AA-A463163AF081}" dt="2022-10-16T23:23:21.520" v="85" actId="20577"/>
+      <pc:sldChg chg="modSp mod modTransition">
+        <pc:chgData name="Loraine gomez" userId="34cb3af7fb3f3f24" providerId="LiveId" clId="{C498CDB4-6168-4151-A0AA-A463163AF081}" dt="2022-10-17T05:28:00.520" v="1195"/>
         <pc:sldMkLst>
           <pc:docMk/>
           <pc:sldMk cId="3895599169" sldId="260"/>
         </pc:sldMkLst>
         <pc:spChg chg="mod">
-          <ac:chgData name="Loraine gomez" userId="34cb3af7fb3f3f24" providerId="LiveId" clId="{C498CDB4-6168-4151-A0AA-A463163AF081}" dt="2022-10-16T23:23:21.520" v="85" actId="20577"/>
+          <ac:chgData name="Loraine gomez" userId="34cb3af7fb3f3f24" providerId="LiveId" clId="{C498CDB4-6168-4151-A0AA-A463163AF081}" dt="2022-10-17T04:53:26.857" v="740" actId="20577"/>
           <ac:spMkLst>
             <pc:docMk/>
             <pc:sldMk cId="3895599169" sldId="260"/>
             <ac:spMk id="4" creationId="{59DF2F12-7FD3-9879-AF09-1413386DBF57}"/>
           </ac:spMkLst>
         </pc:spChg>
+      </pc:sldChg>
+      <pc:sldChg chg="addSp delSp modSp new del mod modTransition modClrScheme chgLayout">
+        <pc:chgData name="Loraine gomez" userId="34cb3af7fb3f3f24" providerId="LiveId" clId="{C498CDB4-6168-4151-A0AA-A463163AF081}" dt="2022-10-17T05:47:32.343" v="1250" actId="47"/>
+        <pc:sldMkLst>
+          <pc:docMk/>
+          <pc:sldMk cId="218781679" sldId="261"/>
+        </pc:sldMkLst>
+        <pc:spChg chg="add del mod">
+          <ac:chgData name="Loraine gomez" userId="34cb3af7fb3f3f24" providerId="LiveId" clId="{C498CDB4-6168-4151-A0AA-A463163AF081}" dt="2022-10-17T04:58:22.560" v="748" actId="478"/>
+          <ac:spMkLst>
+            <pc:docMk/>
+            <pc:sldMk cId="218781679" sldId="261"/>
+            <ac:spMk id="2" creationId="{C24208B5-F1B6-2303-2C31-8ED841674E87}"/>
+          </ac:spMkLst>
+        </pc:spChg>
+        <pc:spChg chg="add del mod">
+          <ac:chgData name="Loraine gomez" userId="34cb3af7fb3f3f24" providerId="LiveId" clId="{C498CDB4-6168-4151-A0AA-A463163AF081}" dt="2022-10-17T04:59:50.061" v="751" actId="931"/>
+          <ac:spMkLst>
+            <pc:docMk/>
+            <pc:sldMk cId="218781679" sldId="261"/>
+            <ac:spMk id="3" creationId="{7C3E9270-CE7C-AF81-D83E-A72E3536B61B}"/>
+          </ac:spMkLst>
+        </pc:spChg>
+        <pc:spChg chg="add del mod">
+          <ac:chgData name="Loraine gomez" userId="34cb3af7fb3f3f24" providerId="LiveId" clId="{C498CDB4-6168-4151-A0AA-A463163AF081}" dt="2022-10-17T05:01:51.847" v="756" actId="478"/>
+          <ac:spMkLst>
+            <pc:docMk/>
+            <pc:sldMk cId="218781679" sldId="261"/>
+            <ac:spMk id="4" creationId="{C4C727D0-48CD-9C39-159B-CAD2DC27843E}"/>
+          </ac:spMkLst>
+        </pc:spChg>
+        <pc:spChg chg="add del mod">
+          <ac:chgData name="Loraine gomez" userId="34cb3af7fb3f3f24" providerId="LiveId" clId="{C498CDB4-6168-4151-A0AA-A463163AF081}" dt="2022-10-17T05:01:47.388" v="755" actId="478"/>
+          <ac:spMkLst>
+            <pc:docMk/>
+            <pc:sldMk cId="218781679" sldId="261"/>
+            <ac:spMk id="8" creationId="{AF128777-E663-ECC3-B843-0B07CEB8C664}"/>
+          </ac:spMkLst>
+        </pc:spChg>
+        <pc:spChg chg="add del mod ord">
+          <ac:chgData name="Loraine gomez" userId="34cb3af7fb3f3f24" providerId="LiveId" clId="{C498CDB4-6168-4151-A0AA-A463163AF081}" dt="2022-10-17T05:09:15.237" v="781" actId="478"/>
+          <ac:spMkLst>
+            <pc:docMk/>
+            <pc:sldMk cId="218781679" sldId="261"/>
+            <ac:spMk id="13" creationId="{17C5D90A-2C0F-13C4-53F9-154B8980328D}"/>
+          </ac:spMkLst>
+        </pc:spChg>
+        <pc:spChg chg="add del mod ord">
+          <ac:chgData name="Loraine gomez" userId="34cb3af7fb3f3f24" providerId="LiveId" clId="{C498CDB4-6168-4151-A0AA-A463163AF081}" dt="2022-10-17T05:06:44.737" v="773" actId="478"/>
+          <ac:spMkLst>
+            <pc:docMk/>
+            <pc:sldMk cId="218781679" sldId="261"/>
+            <ac:spMk id="14" creationId="{4F4562A3-455D-2599-C1E9-2BE55FBB3C41}"/>
+          </ac:spMkLst>
+        </pc:spChg>
+        <pc:spChg chg="add mod ord">
+          <ac:chgData name="Loraine gomez" userId="34cb3af7fb3f3f24" providerId="LiveId" clId="{C498CDB4-6168-4151-A0AA-A463163AF081}" dt="2022-10-17T05:09:22.335" v="787" actId="12"/>
+          <ac:spMkLst>
+            <pc:docMk/>
+            <pc:sldMk cId="218781679" sldId="261"/>
+            <ac:spMk id="15" creationId="{1A47028F-17B7-26DC-5FA3-5E22BA6662A5}"/>
+          </ac:spMkLst>
+        </pc:spChg>
+        <pc:spChg chg="add mod">
+          <ac:chgData name="Loraine gomez" userId="34cb3af7fb3f3f24" providerId="LiveId" clId="{C498CDB4-6168-4151-A0AA-A463163AF081}" dt="2022-10-17T05:47:16.199" v="1246" actId="1076"/>
+          <ac:spMkLst>
+            <pc:docMk/>
+            <pc:sldMk cId="218781679" sldId="261"/>
+            <ac:spMk id="16" creationId="{623F9DC3-CB72-CF42-E4A7-2371652CE70B}"/>
+          </ac:spMkLst>
+        </pc:spChg>
+        <pc:spChg chg="add del">
+          <ac:chgData name="Loraine gomez" userId="34cb3af7fb3f3f24" providerId="LiveId" clId="{C498CDB4-6168-4151-A0AA-A463163AF081}" dt="2022-10-17T05:46:20.108" v="1235" actId="22"/>
+          <ac:spMkLst>
+            <pc:docMk/>
+            <pc:sldMk cId="218781679" sldId="261"/>
+            <ac:spMk id="18" creationId="{7983EDA6-9DF6-6C9C-3D24-E4BB79C5558E}"/>
+          </ac:spMkLst>
+        </pc:spChg>
+        <pc:picChg chg="add del mod">
+          <ac:chgData name="Loraine gomez" userId="34cb3af7fb3f3f24" providerId="LiveId" clId="{C498CDB4-6168-4151-A0AA-A463163AF081}" dt="2022-10-17T05:01:41.820" v="754" actId="478"/>
+          <ac:picMkLst>
+            <pc:docMk/>
+            <pc:sldMk cId="218781679" sldId="261"/>
+            <ac:picMk id="6" creationId="{37F3CB11-83CC-C4E9-58CA-229BBF08B18A}"/>
+          </ac:picMkLst>
+        </pc:picChg>
+        <pc:picChg chg="add del mod">
+          <ac:chgData name="Loraine gomez" userId="34cb3af7fb3f3f24" providerId="LiveId" clId="{C498CDB4-6168-4151-A0AA-A463163AF081}" dt="2022-10-17T05:02:56.295" v="765" actId="478"/>
+          <ac:picMkLst>
+            <pc:docMk/>
+            <pc:sldMk cId="218781679" sldId="261"/>
+            <ac:picMk id="10" creationId="{958472F0-6D2E-0C41-4C46-D2D66C08EEFC}"/>
+          </ac:picMkLst>
+        </pc:picChg>
+        <pc:picChg chg="add mod">
+          <ac:chgData name="Loraine gomez" userId="34cb3af7fb3f3f24" providerId="LiveId" clId="{C498CDB4-6168-4151-A0AA-A463163AF081}" dt="2022-10-17T05:25:21.281" v="1144" actId="14100"/>
+          <ac:picMkLst>
+            <pc:docMk/>
+            <pc:sldMk cId="218781679" sldId="261"/>
+            <ac:picMk id="12" creationId="{3E78E7F6-5D54-2B99-C4F9-02B2D870D482}"/>
+          </ac:picMkLst>
+        </pc:picChg>
+      </pc:sldChg>
+      <pc:sldChg chg="addSp delSp modSp new del mod ord modClrScheme chgLayout">
+        <pc:chgData name="Loraine gomez" userId="34cb3af7fb3f3f24" providerId="LiveId" clId="{C498CDB4-6168-4151-A0AA-A463163AF081}" dt="2022-10-17T05:48:21.885" v="1262" actId="47"/>
+        <pc:sldMkLst>
+          <pc:docMk/>
+          <pc:sldMk cId="3746996278" sldId="262"/>
+        </pc:sldMkLst>
+        <pc:spChg chg="del">
+          <ac:chgData name="Loraine gomez" userId="34cb3af7fb3f3f24" providerId="LiveId" clId="{C498CDB4-6168-4151-A0AA-A463163AF081}" dt="2022-10-17T05:30:34.911" v="1198" actId="478"/>
+          <ac:spMkLst>
+            <pc:docMk/>
+            <pc:sldMk cId="3746996278" sldId="262"/>
+            <ac:spMk id="2" creationId="{B25736D0-F87E-03F8-E7A9-1160161C3FA4}"/>
+          </ac:spMkLst>
+        </pc:spChg>
+        <pc:spChg chg="del mod ord">
+          <ac:chgData name="Loraine gomez" userId="34cb3af7fb3f3f24" providerId="LiveId" clId="{C498CDB4-6168-4151-A0AA-A463163AF081}" dt="2022-10-17T05:31:20.209" v="1214" actId="700"/>
+          <ac:spMkLst>
+            <pc:docMk/>
+            <pc:sldMk cId="3746996278" sldId="262"/>
+            <ac:spMk id="3" creationId="{56CCF7D0-9373-502C-EB5E-DF84C8469717}"/>
+          </ac:spMkLst>
+        </pc:spChg>
+        <pc:spChg chg="del mod ord">
+          <ac:chgData name="Loraine gomez" userId="34cb3af7fb3f3f24" providerId="LiveId" clId="{C498CDB4-6168-4151-A0AA-A463163AF081}" dt="2022-10-17T05:31:27.917" v="1217" actId="478"/>
+          <ac:spMkLst>
+            <pc:docMk/>
+            <pc:sldMk cId="3746996278" sldId="262"/>
+            <ac:spMk id="4" creationId="{37827E2B-0A3D-B4A5-BAA9-4433F1909D77}"/>
+          </ac:spMkLst>
+        </pc:spChg>
+        <pc:spChg chg="add mod ord">
+          <ac:chgData name="Loraine gomez" userId="34cb3af7fb3f3f24" providerId="LiveId" clId="{C498CDB4-6168-4151-A0AA-A463163AF081}" dt="2022-10-17T05:31:47.706" v="1227" actId="113"/>
+          <ac:spMkLst>
+            <pc:docMk/>
+            <pc:sldMk cId="3746996278" sldId="262"/>
+            <ac:spMk id="5" creationId="{E3C63512-DB91-0854-914F-6515D2EF6F69}"/>
+          </ac:spMkLst>
+        </pc:spChg>
+        <pc:spChg chg="add mod ord">
+          <ac:chgData name="Loraine gomez" userId="34cb3af7fb3f3f24" providerId="LiveId" clId="{C498CDB4-6168-4151-A0AA-A463163AF081}" dt="2022-10-17T05:46:30.125" v="1238" actId="5793"/>
+          <ac:spMkLst>
+            <pc:docMk/>
+            <pc:sldMk cId="3746996278" sldId="262"/>
+            <ac:spMk id="6" creationId="{D4B0C6BA-594F-908E-8AA3-EC53B6AD285D}"/>
+          </ac:spMkLst>
+        </pc:spChg>
+        <pc:spChg chg="add del mod ord">
+          <ac:chgData name="Loraine gomez" userId="34cb3af7fb3f3f24" providerId="LiveId" clId="{C498CDB4-6168-4151-A0AA-A463163AF081}" dt="2022-10-17T05:31:39.709" v="1219" actId="478"/>
+          <ac:spMkLst>
+            <pc:docMk/>
+            <pc:sldMk cId="3746996278" sldId="262"/>
+            <ac:spMk id="7" creationId="{33658C84-4578-469A-6200-B5198A21E6E7}"/>
+          </ac:spMkLst>
+        </pc:spChg>
+        <pc:spChg chg="add del mod ord">
+          <ac:chgData name="Loraine gomez" userId="34cb3af7fb3f3f24" providerId="LiveId" clId="{C498CDB4-6168-4151-A0AA-A463163AF081}" dt="2022-10-17T05:31:53.442" v="1229" actId="478"/>
+          <ac:spMkLst>
+            <pc:docMk/>
+            <pc:sldMk cId="3746996278" sldId="262"/>
+            <ac:spMk id="8" creationId="{83D90371-84D7-60F2-7BEA-18D7853CFBB5}"/>
+          </ac:spMkLst>
+        </pc:spChg>
+        <pc:spChg chg="add del mod">
+          <ac:chgData name="Loraine gomez" userId="34cb3af7fb3f3f24" providerId="LiveId" clId="{C498CDB4-6168-4151-A0AA-A463163AF081}" dt="2022-10-17T05:31:32.454" v="1218" actId="478"/>
+          <ac:spMkLst>
+            <pc:docMk/>
+            <pc:sldMk cId="3746996278" sldId="262"/>
+            <ac:spMk id="10" creationId="{7E2D4830-D4AD-FF6E-A95A-A3EBDBA2A163}"/>
+          </ac:spMkLst>
+        </pc:spChg>
+      </pc:sldChg>
+      <pc:sldChg chg="addSp delSp modSp add del mod">
+        <pc:chgData name="Loraine gomez" userId="34cb3af7fb3f3f24" providerId="LiveId" clId="{C498CDB4-6168-4151-A0AA-A463163AF081}" dt="2022-10-17T05:48:05.172" v="1258" actId="1076"/>
+        <pc:sldMkLst>
+          <pc:docMk/>
+          <pc:sldMk cId="105170645" sldId="263"/>
+        </pc:sldMkLst>
+        <pc:spChg chg="mod">
+          <ac:chgData name="Loraine gomez" userId="34cb3af7fb3f3f24" providerId="LiveId" clId="{C498CDB4-6168-4151-A0AA-A463163AF081}" dt="2022-10-17T05:48:05.172" v="1258" actId="1076"/>
+          <ac:spMkLst>
+            <pc:docMk/>
+            <pc:sldMk cId="105170645" sldId="263"/>
+            <ac:spMk id="4" creationId="{59DF2F12-7FD3-9879-AF09-1413386DBF57}"/>
+          </ac:spMkLst>
+        </pc:spChg>
+        <pc:picChg chg="add mod">
+          <ac:chgData name="Loraine gomez" userId="34cb3af7fb3f3f24" providerId="LiveId" clId="{C498CDB4-6168-4151-A0AA-A463163AF081}" dt="2022-10-17T05:48:00.758" v="1257" actId="14100"/>
+          <ac:picMkLst>
+            <pc:docMk/>
+            <pc:sldMk cId="105170645" sldId="263"/>
+            <ac:picMk id="2" creationId="{8D8C2AA1-C0F1-7376-F5A8-62BC7484118B}"/>
+          </ac:picMkLst>
+        </pc:picChg>
+        <pc:picChg chg="del">
+          <ac:chgData name="Loraine gomez" userId="34cb3af7fb3f3f24" providerId="LiveId" clId="{C498CDB4-6168-4151-A0AA-A463163AF081}" dt="2022-10-17T05:46:41.718" v="1240" actId="478"/>
+          <ac:picMkLst>
+            <pc:docMk/>
+            <pc:sldMk cId="105170645" sldId="263"/>
+            <ac:picMk id="3" creationId="{77F2F5DC-016A-03FC-9ADF-AA78CC657F86}"/>
+          </ac:picMkLst>
+        </pc:picChg>
+      </pc:sldChg>
+      <pc:sldChg chg="delSp modSp add mod">
+        <pc:chgData name="Loraine gomez" userId="34cb3af7fb3f3f24" providerId="LiveId" clId="{C498CDB4-6168-4151-A0AA-A463163AF081}" dt="2022-10-17T05:49:01.009" v="1277" actId="20577"/>
+        <pc:sldMkLst>
+          <pc:docMk/>
+          <pc:sldMk cId="198456417" sldId="264"/>
+        </pc:sldMkLst>
+        <pc:spChg chg="mod">
+          <ac:chgData name="Loraine gomez" userId="34cb3af7fb3f3f24" providerId="LiveId" clId="{C498CDB4-6168-4151-A0AA-A463163AF081}" dt="2022-10-17T05:49:01.009" v="1277" actId="20577"/>
+          <ac:spMkLst>
+            <pc:docMk/>
+            <pc:sldMk cId="198456417" sldId="264"/>
+            <ac:spMk id="4" creationId="{59DF2F12-7FD3-9879-AF09-1413386DBF57}"/>
+          </ac:spMkLst>
+        </pc:spChg>
+        <pc:picChg chg="del">
+          <ac:chgData name="Loraine gomez" userId="34cb3af7fb3f3f24" providerId="LiveId" clId="{C498CDB4-6168-4151-A0AA-A463163AF081}" dt="2022-10-17T05:48:24.831" v="1263" actId="478"/>
+          <ac:picMkLst>
+            <pc:docMk/>
+            <pc:sldMk cId="198456417" sldId="264"/>
+            <ac:picMk id="2" creationId="{8D8C2AA1-C0F1-7376-F5A8-62BC7484118B}"/>
+          </ac:picMkLst>
+        </pc:picChg>
       </pc:sldChg>
     </pc:docChg>
   </pc:docChgLst>
@@ -3543,6 +3837,9 @@
   <p:clrMapOvr>
     <a:masterClrMapping/>
   </p:clrMapOvr>
+  <p:transition spd="slow">
+    <p:randomBar dir="vert"/>
+  </p:transition>
 </p:sld>
 </file>
 
@@ -3598,6 +3895,36 @@
           </a:bodyPr>
           <a:lstStyle/>
           <a:p>
+            <a:pPr>
+              <a:lnSpc>
+                <a:spcPct val="90000"/>
+              </a:lnSpc>
+              <a:spcAft>
+                <a:spcPts val="600"/>
+              </a:spcAft>
+            </a:pPr>
+            <a:r>
+              <a:rPr lang="en-US" sz="2000" dirty="0"/>
+              <a:t>Home Page:</a:t>
+            </a:r>
+          </a:p>
+          <a:p>
+            <a:pPr marL="342900" indent="-342900">
+              <a:lnSpc>
+                <a:spcPct val="90000"/>
+              </a:lnSpc>
+              <a:spcAft>
+                <a:spcPts val="600"/>
+              </a:spcAft>
+              <a:buFont typeface="Arial" panose="020B0604020202020204" pitchFamily="34" charset="0"/>
+              <a:buChar char="•"/>
+            </a:pPr>
+            <a:r>
+              <a:rPr lang="en-US" sz="2000" dirty="0"/>
+              <a:t>Gives a list of respiratory illnesses and diseases that can be caused by air pollution. </a:t>
+            </a:r>
+          </a:p>
+          <a:p>
             <a:pPr indent="-228600">
               <a:lnSpc>
                 <a:spcPct val="90000"/>
@@ -3610,39 +3937,7 @@
             </a:pPr>
             <a:r>
               <a:rPr lang="en-US" sz="2000" dirty="0"/>
-              <a:t>Home Page:</a:t>
-            </a:r>
-          </a:p>
-          <a:p>
-            <a:pPr indent="-228600">
-              <a:lnSpc>
-                <a:spcPct val="90000"/>
-              </a:lnSpc>
-              <a:spcAft>
-                <a:spcPts val="600"/>
-              </a:spcAft>
-              <a:buFont typeface="Arial" panose="020B0604020202020204" pitchFamily="34" charset="0"/>
-              <a:buChar char="•"/>
-            </a:pPr>
-            <a:r>
-              <a:rPr lang="en-US" sz="2000" dirty="0"/>
-              <a:t>Gives a brief description of the respiratory illnesses and diseases that can be caused by air pollution. </a:t>
-            </a:r>
-          </a:p>
-          <a:p>
-            <a:pPr indent="-228600">
-              <a:lnSpc>
-                <a:spcPct val="90000"/>
-              </a:lnSpc>
-              <a:spcAft>
-                <a:spcPts val="600"/>
-              </a:spcAft>
-              <a:buFont typeface="Arial" panose="020B0604020202020204" pitchFamily="34" charset="0"/>
-              <a:buChar char="•"/>
-            </a:pPr>
-            <a:r>
-              <a:rPr lang="en-US" sz="2000" dirty="0"/>
-              <a:t>Nav Bar will take you to various charts.</a:t>
+              <a:t>Navigation Bar showcases different charts of data.</a:t>
             </a:r>
           </a:p>
         </p:txBody>
@@ -3830,6 +4125,18 @@
   <p:clrMapOvr>
     <a:masterClrMapping/>
   </p:clrMapOvr>
+  <mc:AlternateContent xmlns:mc="http://schemas.openxmlformats.org/markup-compatibility/2006">
+    <mc:Choice xmlns:p14="http://schemas.microsoft.com/office/powerpoint/2010/main" Requires="p14">
+      <p:transition spd="med" p14:dur="700">
+        <p:fade/>
+      </p:transition>
+    </mc:Choice>
+    <mc:Fallback>
+      <p:transition spd="med">
+        <p:fade/>
+      </p:transition>
+    </mc:Fallback>
+  </mc:AlternateContent>
 </p:sld>
 </file>
 
@@ -3896,15 +4203,15 @@
               <a:buChar char="•"/>
             </a:pPr>
             <a:r>
-              <a:rPr lang="en-US" sz="2400"/>
+              <a:rPr lang="en-US" sz="2400" dirty="0"/>
               <a:t>The AQI Dashboard Menu Option</a:t>
             </a:r>
             <a:br>
-              <a:rPr lang="en-US" sz="2400"/>
+              <a:rPr lang="en-US" sz="2400" dirty="0"/>
             </a:br>
             <a:r>
-              <a:rPr lang="en-US" sz="2400"/>
-              <a:t>redirects to the plotly interactive map that allows a user to select a year and state to discover how many hours in that year the air quality fell into the various AQI index categories</a:t>
+              <a:rPr lang="en-US" sz="2400" dirty="0"/>
+              <a:t>redirects to the Plotly interactive map that allows a user to select a year and state to discover how many hours in that year the air quality fell into the various AQI index categories.</a:t>
             </a:r>
           </a:p>
         </p:txBody>
@@ -4048,10 +4355,10 @@
       </p:sp>
       <p:pic>
         <p:nvPicPr>
-          <p:cNvPr id="3" name="Picture 2">
-            <a:extLst>
-              <a:ext uri="{FF2B5EF4-FFF2-40B4-BE49-F238E27FC236}">
-                <a16:creationId xmlns:a16="http://schemas.microsoft.com/office/drawing/2014/main" id="{C4B7F4EB-3773-6EBC-938E-6ADBBB5FC4AB}"/>
+          <p:cNvPr id="7" name="Picture 6">
+            <a:extLst>
+              <a:ext uri="{FF2B5EF4-FFF2-40B4-BE49-F238E27FC236}">
+                <a16:creationId xmlns:a16="http://schemas.microsoft.com/office/drawing/2014/main" id="{503BCA71-B547-463E-94DC-FC0CAEEE44EF}"/>
               </a:ext>
             </a:extLst>
           </p:cNvPr>
@@ -4061,20 +4368,25 @@
           <p:nvPr/>
         </p:nvPicPr>
         <p:blipFill>
-          <a:blip r:embed="rId2"/>
+          <a:blip r:embed="rId2">
+            <a:extLst>
+              <a:ext uri="{28A0092B-C50C-407E-A947-70E740481C1C}">
+                <a14:useLocalDpi xmlns:a14="http://schemas.microsoft.com/office/drawing/2010/main" val="0"/>
+              </a:ext>
+            </a:extLst>
+          </a:blip>
           <a:stretch>
             <a:fillRect/>
           </a:stretch>
         </p:blipFill>
         <p:spPr>
           <a:xfrm>
-            <a:off x="6904709" y="2370033"/>
-            <a:ext cx="4475531" cy="2114687"/>
+            <a:off x="6577582" y="1778466"/>
+            <a:ext cx="5130204" cy="2860646"/>
           </a:xfrm>
           <a:prstGeom prst="rect">
             <a:avLst/>
           </a:prstGeom>
-          <a:effectLst/>
         </p:spPr>
       </p:pic>
     </p:spTree>
@@ -4087,6 +4399,18 @@
   <p:clrMapOvr>
     <a:masterClrMapping/>
   </p:clrMapOvr>
+  <mc:AlternateContent xmlns:mc="http://schemas.openxmlformats.org/markup-compatibility/2006">
+    <mc:Choice xmlns:p14="http://schemas.microsoft.com/office/powerpoint/2010/main" Requires="p14">
+      <p:transition spd="med" p14:dur="700">
+        <p:fade/>
+      </p:transition>
+    </mc:Choice>
+    <mc:Fallback>
+      <p:transition spd="med">
+        <p:fade/>
+      </p:transition>
+    </mc:Fallback>
+  </mc:AlternateContent>
 </p:sld>
 </file>
 
@@ -4154,7 +4478,7 @@
             </a:pPr>
             <a:r>
               <a:rPr lang="en-US" sz="2400" dirty="0"/>
-              <a:t>The Heatmaps menu item will take the user to the map of the USA displaying where air quality is located and the measurement.</a:t>
+              <a:t>The Location menu item will take the user to a map of U.S., displaying where air quality is located.</a:t>
             </a:r>
           </a:p>
         </p:txBody>
@@ -4337,6 +4661,18 @@
   <p:clrMapOvr>
     <a:masterClrMapping/>
   </p:clrMapOvr>
+  <mc:AlternateContent xmlns:mc="http://schemas.openxmlformats.org/markup-compatibility/2006">
+    <mc:Choice xmlns:p14="http://schemas.microsoft.com/office/powerpoint/2010/main" Requires="p14">
+      <p:transition spd="med" p14:dur="700">
+        <p:fade/>
+      </p:transition>
+    </mc:Choice>
+    <mc:Fallback>
+      <p:transition spd="med">
+        <p:fade/>
+      </p:transition>
+    </mc:Fallback>
+  </mc:AlternateContent>
 </p:sld>
 </file>
 
@@ -4404,15 +4740,7 @@
             </a:pPr>
             <a:r>
               <a:rPr lang="en-US" sz="2000" dirty="0"/>
-              <a:t>The ! Menu option redirects to a </a:t>
-            </a:r>
-            <a:r>
-              <a:rPr lang="en-US" sz="2000" dirty="0" err="1"/>
-              <a:t>Plotly</a:t>
-            </a:r>
-            <a:r>
-              <a:rPr lang="en-US" sz="2000" dirty="0"/>
-              <a:t> chart that displays the count of all respiratory deaths in a selected year within a selected state.</a:t>
+              <a:t>The Respiratory Dashboard Menu option redirects to a Plotly chart that displays the count of all respiratory deaths in a selected year within a selected state from 2020 to 2022.</a:t>
             </a:r>
           </a:p>
         </p:txBody>
@@ -4595,6 +4923,536 @@
   <p:clrMapOvr>
     <a:masterClrMapping/>
   </p:clrMapOvr>
+  <mc:AlternateContent xmlns:mc="http://schemas.openxmlformats.org/markup-compatibility/2006">
+    <mc:Choice xmlns:p14="http://schemas.microsoft.com/office/powerpoint/2010/main" Requires="p14">
+      <p:transition spd="med" p14:dur="700">
+        <p:fade/>
+      </p:transition>
+    </mc:Choice>
+    <mc:Fallback>
+      <p:transition spd="med">
+        <p:fade/>
+      </p:transition>
+    </mc:Fallback>
+  </mc:AlternateContent>
+</p:sld>
+</file>
+
+<file path=ppt/slides/slide6.xml><?xml version="1.0" encoding="utf-8"?>
+<p:sld xmlns:a="http://schemas.openxmlformats.org/drawingml/2006/main" xmlns:r="http://schemas.openxmlformats.org/officeDocument/2006/relationships" xmlns:p="http://schemas.openxmlformats.org/presentationml/2006/main">
+  <p:cSld>
+    <p:bg>
+      <p:bgPr>
+        <a:solidFill>
+          <a:schemeClr val="bg1"/>
+        </a:solidFill>
+        <a:effectLst/>
+      </p:bgPr>
+    </p:bg>
+    <p:spTree>
+      <p:nvGrpSpPr>
+        <p:cNvPr id="1" name=""/>
+        <p:cNvGrpSpPr/>
+        <p:nvPr/>
+      </p:nvGrpSpPr>
+      <p:grpSpPr>
+        <a:xfrm>
+          <a:off x="0" y="0"/>
+          <a:ext cx="0" cy="0"/>
+          <a:chOff x="0" y="0"/>
+          <a:chExt cx="0" cy="0"/>
+        </a:xfrm>
+      </p:grpSpPr>
+      <p:sp>
+        <p:nvSpPr>
+          <p:cNvPr id="4" name="TextBox 3">
+            <a:extLst>
+              <a:ext uri="{FF2B5EF4-FFF2-40B4-BE49-F238E27FC236}">
+                <a16:creationId xmlns:a16="http://schemas.microsoft.com/office/drawing/2014/main" id="{59DF2F12-7FD3-9879-AF09-1413386DBF57}"/>
+              </a:ext>
+            </a:extLst>
+          </p:cNvPr>
+          <p:cNvSpPr txBox="1"/>
+          <p:nvPr/>
+        </p:nvSpPr>
+        <p:spPr>
+          <a:xfrm>
+            <a:off x="649348" y="1694916"/>
+            <a:ext cx="3505494" cy="3785419"/>
+          </a:xfrm>
+          <a:prstGeom prst="rect">
+            <a:avLst/>
+          </a:prstGeom>
+        </p:spPr>
+        <p:txBody>
+          <a:bodyPr vert="horz" lIns="91440" tIns="45720" rIns="91440" bIns="45720" rtlCol="0">
+            <a:normAutofit/>
+          </a:bodyPr>
+          <a:lstStyle/>
+          <a:p>
+            <a:pPr indent="-228600">
+              <a:lnSpc>
+                <a:spcPct val="90000"/>
+              </a:lnSpc>
+              <a:spcAft>
+                <a:spcPts val="600"/>
+              </a:spcAft>
+              <a:buFont typeface="Arial" panose="020B0604020202020204" pitchFamily="34" charset="0"/>
+              <a:buChar char="•"/>
+            </a:pPr>
+            <a:r>
+              <a:rPr lang="en-US" sz="2000" dirty="0"/>
+              <a:t>The Pollution Dashboard Menu option redirects to a Plotly chart that displays the health levels in air quality and respiratory death counts by making a selection for the year and state from 2020 to 2022.</a:t>
+            </a:r>
+          </a:p>
+          <a:p>
+            <a:pPr>
+              <a:lnSpc>
+                <a:spcPct val="90000"/>
+              </a:lnSpc>
+              <a:spcAft>
+                <a:spcPts val="600"/>
+              </a:spcAft>
+            </a:pPr>
+            <a:endParaRPr lang="en-US" sz="2000" dirty="0"/>
+          </a:p>
+        </p:txBody>
+      </p:sp>
+      <p:sp>
+        <p:nvSpPr>
+          <p:cNvPr id="9" name="Rectangle 8">
+            <a:extLst>
+              <a:ext uri="{FF2B5EF4-FFF2-40B4-BE49-F238E27FC236}">
+                <a16:creationId xmlns:a16="http://schemas.microsoft.com/office/drawing/2014/main" id="{5E39A796-BE83-48B1-B33F-35C4A32AAB57}"/>
+              </a:ext>
+              <a:ext uri="{C183D7F6-B498-43B3-948B-1728B52AA6E4}">
+                <adec:decorative xmlns:adec="http://schemas.microsoft.com/office/drawing/2017/decorative" val="1"/>
+              </a:ext>
+            </a:extLst>
+          </p:cNvPr>
+          <p:cNvSpPr>
+            <a:spLocks noGrp="1" noRot="1" noChangeAspect="1" noMove="1" noResize="1" noEditPoints="1" noAdjustHandles="1" noChangeArrowheads="1" noChangeShapeType="1" noTextEdit="1"/>
+          </p:cNvSpPr>
+          <p:nvPr>
+            <p:extLst>
+              <p:ext uri="{386F3935-93C4-4BCD-93E2-E3B085C9AB24}">
+                <p16:designElem xmlns:p16="http://schemas.microsoft.com/office/powerpoint/2015/main" val="1"/>
+              </p:ext>
+            </p:extLst>
+          </p:nvPr>
+        </p:nvSpPr>
+        <p:spPr>
+          <a:xfrm>
+            <a:off x="4639056" y="0"/>
+            <a:ext cx="7552944" cy="6858000"/>
+          </a:xfrm>
+          <a:prstGeom prst="rect">
+            <a:avLst/>
+          </a:prstGeom>
+          <a:solidFill>
+            <a:srgbClr val="C8CACA"/>
+          </a:solidFill>
+          <a:ln>
+            <a:noFill/>
+          </a:ln>
+        </p:spPr>
+        <p:style>
+          <a:lnRef idx="2">
+            <a:schemeClr val="accent1">
+              <a:shade val="50000"/>
+            </a:schemeClr>
+          </a:lnRef>
+          <a:fillRef idx="1">
+            <a:schemeClr val="accent1"/>
+          </a:fillRef>
+          <a:effectRef idx="0">
+            <a:schemeClr val="accent1"/>
+          </a:effectRef>
+          <a:fontRef idx="minor">
+            <a:schemeClr val="lt1"/>
+          </a:fontRef>
+        </p:style>
+        <p:txBody>
+          <a:bodyPr rtlCol="0" anchor="ctr"/>
+          <a:lstStyle/>
+          <a:p>
+            <a:pPr algn="ctr"/>
+            <a:endParaRPr lang="en-US"/>
+          </a:p>
+        </p:txBody>
+      </p:sp>
+      <p:sp>
+        <p:nvSpPr>
+          <p:cNvPr id="11" name="Rounded Rectangle 9">
+            <a:extLst>
+              <a:ext uri="{FF2B5EF4-FFF2-40B4-BE49-F238E27FC236}">
+                <a16:creationId xmlns:a16="http://schemas.microsoft.com/office/drawing/2014/main" id="{72F84B47-E267-4194-8194-831DB7B5547F}"/>
+              </a:ext>
+              <a:ext uri="{C183D7F6-B498-43B3-948B-1728B52AA6E4}">
+                <adec:decorative xmlns:adec="http://schemas.microsoft.com/office/drawing/2017/decorative" val="1"/>
+              </a:ext>
+            </a:extLst>
+          </p:cNvPr>
+          <p:cNvSpPr>
+            <a:spLocks noGrp="1" noRot="1" noChangeAspect="1" noMove="1" noResize="1" noEditPoints="1" noAdjustHandles="1" noChangeArrowheads="1" noChangeShapeType="1" noTextEdit="1"/>
+          </p:cNvSpPr>
+          <p:nvPr>
+            <p:extLst>
+              <p:ext uri="{386F3935-93C4-4BCD-93E2-E3B085C9AB24}">
+                <p16:designElem xmlns:p16="http://schemas.microsoft.com/office/powerpoint/2015/main" val="1"/>
+              </p:ext>
+            </p:extLst>
+          </p:nvPr>
+        </p:nvSpPr>
+        <p:spPr>
+          <a:xfrm>
+            <a:off x="5123688" y="557784"/>
+            <a:ext cx="6584098" cy="5739187"/>
+          </a:xfrm>
+          <a:prstGeom prst="roundRect">
+            <a:avLst>
+              <a:gd name="adj" fmla="val 0"/>
+            </a:avLst>
+          </a:prstGeom>
+          <a:solidFill>
+            <a:srgbClr val="FFFFFF"/>
+          </a:solidFill>
+          <a:ln w="9525">
+            <a:solidFill>
+              <a:srgbClr val="C8CACA"/>
+            </a:solidFill>
+          </a:ln>
+          <a:effectLst>
+            <a:outerShdw blurRad="57150" dist="19050" dir="5400000" algn="t" rotWithShape="0">
+              <a:prstClr val="black">
+                <a:alpha val="63000"/>
+              </a:prstClr>
+            </a:outerShdw>
+          </a:effectLst>
+        </p:spPr>
+        <p:style>
+          <a:lnRef idx="2">
+            <a:schemeClr val="accent1">
+              <a:shade val="50000"/>
+            </a:schemeClr>
+          </a:lnRef>
+          <a:fillRef idx="1">
+            <a:schemeClr val="accent1"/>
+          </a:fillRef>
+          <a:effectRef idx="0">
+            <a:schemeClr val="accent1"/>
+          </a:effectRef>
+          <a:fontRef idx="minor">
+            <a:schemeClr val="lt1"/>
+          </a:fontRef>
+        </p:style>
+        <p:txBody>
+          <a:bodyPr rtlCol="0" anchor="ctr"/>
+          <a:lstStyle/>
+          <a:p>
+            <a:pPr algn="ctr"/>
+            <a:endParaRPr lang="en-US"/>
+          </a:p>
+        </p:txBody>
+      </p:sp>
+      <p:pic>
+        <p:nvPicPr>
+          <p:cNvPr id="2" name="Picture 1">
+            <a:extLst>
+              <a:ext uri="{FF2B5EF4-FFF2-40B4-BE49-F238E27FC236}">
+                <a16:creationId xmlns:a16="http://schemas.microsoft.com/office/drawing/2014/main" id="{8D8C2AA1-C0F1-7376-F5A8-62BC7484118B}"/>
+              </a:ext>
+            </a:extLst>
+          </p:cNvPr>
+          <p:cNvPicPr>
+            <a:picLocks noChangeAspect="1"/>
+          </p:cNvPicPr>
+          <p:nvPr/>
+        </p:nvPicPr>
+        <p:blipFill>
+          <a:blip r:embed="rId2">
+            <a:extLst>
+              <a:ext uri="{28A0092B-C50C-407E-A947-70E740481C1C}">
+                <a14:useLocalDpi xmlns:a14="http://schemas.microsoft.com/office/drawing/2010/main" val="0"/>
+              </a:ext>
+            </a:extLst>
+          </a:blip>
+          <a:stretch>
+            <a:fillRect/>
+          </a:stretch>
+        </p:blipFill>
+        <p:spPr>
+          <a:xfrm>
+            <a:off x="5123688" y="557784"/>
+            <a:ext cx="6584098" cy="4506913"/>
+          </a:xfrm>
+          <a:prstGeom prst="rect">
+            <a:avLst/>
+          </a:prstGeom>
+        </p:spPr>
+      </p:pic>
+    </p:spTree>
+    <p:extLst>
+      <p:ext uri="{BB962C8B-B14F-4D97-AF65-F5344CB8AC3E}">
+        <p14:creationId xmlns:p14="http://schemas.microsoft.com/office/powerpoint/2010/main" val="105170645"/>
+      </p:ext>
+    </p:extLst>
+  </p:cSld>
+  <p:clrMapOvr>
+    <a:masterClrMapping/>
+  </p:clrMapOvr>
+  <mc:AlternateContent xmlns:mc="http://schemas.openxmlformats.org/markup-compatibility/2006">
+    <mc:Choice xmlns:p14="http://schemas.microsoft.com/office/powerpoint/2010/main" Requires="p14">
+      <p:transition spd="med" p14:dur="700">
+        <p:fade/>
+      </p:transition>
+    </mc:Choice>
+    <mc:Fallback>
+      <p:transition spd="med">
+        <p:fade/>
+      </p:transition>
+    </mc:Fallback>
+  </mc:AlternateContent>
+</p:sld>
+</file>
+
+<file path=ppt/slides/slide7.xml><?xml version="1.0" encoding="utf-8"?>
+<p:sld xmlns:a="http://schemas.openxmlformats.org/drawingml/2006/main" xmlns:r="http://schemas.openxmlformats.org/officeDocument/2006/relationships" xmlns:p="http://schemas.openxmlformats.org/presentationml/2006/main">
+  <p:cSld>
+    <p:bg>
+      <p:bgPr>
+        <a:solidFill>
+          <a:schemeClr val="bg1"/>
+        </a:solidFill>
+        <a:effectLst/>
+      </p:bgPr>
+    </p:bg>
+    <p:spTree>
+      <p:nvGrpSpPr>
+        <p:cNvPr id="1" name=""/>
+        <p:cNvGrpSpPr/>
+        <p:nvPr/>
+      </p:nvGrpSpPr>
+      <p:grpSpPr>
+        <a:xfrm>
+          <a:off x="0" y="0"/>
+          <a:ext cx="0" cy="0"/>
+          <a:chOff x="0" y="0"/>
+          <a:chExt cx="0" cy="0"/>
+        </a:xfrm>
+      </p:grpSpPr>
+      <p:sp>
+        <p:nvSpPr>
+          <p:cNvPr id="4" name="TextBox 3">
+            <a:extLst>
+              <a:ext uri="{FF2B5EF4-FFF2-40B4-BE49-F238E27FC236}">
+                <a16:creationId xmlns:a16="http://schemas.microsoft.com/office/drawing/2014/main" id="{59DF2F12-7FD3-9879-AF09-1413386DBF57}"/>
+              </a:ext>
+            </a:extLst>
+          </p:cNvPr>
+          <p:cNvSpPr txBox="1"/>
+          <p:nvPr/>
+        </p:nvSpPr>
+        <p:spPr>
+          <a:xfrm>
+            <a:off x="484214" y="1796924"/>
+            <a:ext cx="3505494" cy="3785419"/>
+          </a:xfrm>
+          <a:prstGeom prst="rect">
+            <a:avLst/>
+          </a:prstGeom>
+        </p:spPr>
+        <p:txBody>
+          <a:bodyPr vert="horz" lIns="91440" tIns="45720" rIns="91440" bIns="45720" rtlCol="0">
+            <a:normAutofit/>
+          </a:bodyPr>
+          <a:lstStyle/>
+          <a:p>
+            <a:pPr>
+              <a:lnSpc>
+                <a:spcPct val="90000"/>
+              </a:lnSpc>
+              <a:spcAft>
+                <a:spcPts val="600"/>
+              </a:spcAft>
+            </a:pPr>
+            <a:r>
+              <a:rPr lang="en-US" sz="3600" dirty="0"/>
+              <a:t>SOURCES:</a:t>
+            </a:r>
+          </a:p>
+          <a:p>
+            <a:pPr>
+              <a:lnSpc>
+                <a:spcPct val="90000"/>
+              </a:lnSpc>
+              <a:spcAft>
+                <a:spcPts val="600"/>
+              </a:spcAft>
+            </a:pPr>
+            <a:endParaRPr lang="en-US" sz="2000" dirty="0"/>
+          </a:p>
+        </p:txBody>
+      </p:sp>
+      <p:sp>
+        <p:nvSpPr>
+          <p:cNvPr id="9" name="Rectangle 8">
+            <a:extLst>
+              <a:ext uri="{FF2B5EF4-FFF2-40B4-BE49-F238E27FC236}">
+                <a16:creationId xmlns:a16="http://schemas.microsoft.com/office/drawing/2014/main" id="{5E39A796-BE83-48B1-B33F-35C4A32AAB57}"/>
+              </a:ext>
+              <a:ext uri="{C183D7F6-B498-43B3-948B-1728B52AA6E4}">
+                <adec:decorative xmlns:adec="http://schemas.microsoft.com/office/drawing/2017/decorative" val="1"/>
+              </a:ext>
+            </a:extLst>
+          </p:cNvPr>
+          <p:cNvSpPr>
+            <a:spLocks noGrp="1" noRot="1" noChangeAspect="1" noMove="1" noResize="1" noEditPoints="1" noAdjustHandles="1" noChangeArrowheads="1" noChangeShapeType="1" noTextEdit="1"/>
+          </p:cNvSpPr>
+          <p:nvPr>
+            <p:extLst>
+              <p:ext uri="{386F3935-93C4-4BCD-93E2-E3B085C9AB24}">
+                <p16:designElem xmlns:p16="http://schemas.microsoft.com/office/powerpoint/2015/main" val="1"/>
+              </p:ext>
+            </p:extLst>
+          </p:nvPr>
+        </p:nvSpPr>
+        <p:spPr>
+          <a:xfrm>
+            <a:off x="4639056" y="0"/>
+            <a:ext cx="7552944" cy="6858000"/>
+          </a:xfrm>
+          <a:prstGeom prst="rect">
+            <a:avLst/>
+          </a:prstGeom>
+          <a:solidFill>
+            <a:srgbClr val="C8CACA"/>
+          </a:solidFill>
+          <a:ln>
+            <a:noFill/>
+          </a:ln>
+        </p:spPr>
+        <p:style>
+          <a:lnRef idx="2">
+            <a:schemeClr val="accent1">
+              <a:shade val="50000"/>
+            </a:schemeClr>
+          </a:lnRef>
+          <a:fillRef idx="1">
+            <a:schemeClr val="accent1"/>
+          </a:fillRef>
+          <a:effectRef idx="0">
+            <a:schemeClr val="accent1"/>
+          </a:effectRef>
+          <a:fontRef idx="minor">
+            <a:schemeClr val="lt1"/>
+          </a:fontRef>
+        </p:style>
+        <p:txBody>
+          <a:bodyPr rtlCol="0" anchor="ctr"/>
+          <a:lstStyle/>
+          <a:p>
+            <a:pPr algn="ctr"/>
+            <a:endParaRPr lang="en-US"/>
+          </a:p>
+        </p:txBody>
+      </p:sp>
+      <p:sp>
+        <p:nvSpPr>
+          <p:cNvPr id="11" name="Rounded Rectangle 9">
+            <a:extLst>
+              <a:ext uri="{FF2B5EF4-FFF2-40B4-BE49-F238E27FC236}">
+                <a16:creationId xmlns:a16="http://schemas.microsoft.com/office/drawing/2014/main" id="{72F84B47-E267-4194-8194-831DB7B5547F}"/>
+              </a:ext>
+              <a:ext uri="{C183D7F6-B498-43B3-948B-1728B52AA6E4}">
+                <adec:decorative xmlns:adec="http://schemas.microsoft.com/office/drawing/2017/decorative" val="1"/>
+              </a:ext>
+            </a:extLst>
+          </p:cNvPr>
+          <p:cNvSpPr>
+            <a:spLocks noGrp="1" noRot="1" noChangeAspect="1" noMove="1" noResize="1" noEditPoints="1" noAdjustHandles="1" noChangeArrowheads="1" noChangeShapeType="1" noTextEdit="1"/>
+          </p:cNvSpPr>
+          <p:nvPr>
+            <p:extLst>
+              <p:ext uri="{386F3935-93C4-4BCD-93E2-E3B085C9AB24}">
+                <p16:designElem xmlns:p16="http://schemas.microsoft.com/office/powerpoint/2015/main" val="1"/>
+              </p:ext>
+            </p:extLst>
+          </p:nvPr>
+        </p:nvSpPr>
+        <p:spPr>
+          <a:xfrm>
+            <a:off x="5123688" y="557784"/>
+            <a:ext cx="6584098" cy="5739187"/>
+          </a:xfrm>
+          <a:prstGeom prst="roundRect">
+            <a:avLst>
+              <a:gd name="adj" fmla="val 0"/>
+            </a:avLst>
+          </a:prstGeom>
+          <a:solidFill>
+            <a:srgbClr val="FFFFFF"/>
+          </a:solidFill>
+          <a:ln w="9525">
+            <a:solidFill>
+              <a:srgbClr val="C8CACA"/>
+            </a:solidFill>
+          </a:ln>
+          <a:effectLst>
+            <a:outerShdw blurRad="57150" dist="19050" dir="5400000" algn="t" rotWithShape="0">
+              <a:prstClr val="black">
+                <a:alpha val="63000"/>
+              </a:prstClr>
+            </a:outerShdw>
+          </a:effectLst>
+        </p:spPr>
+        <p:style>
+          <a:lnRef idx="2">
+            <a:schemeClr val="accent1">
+              <a:shade val="50000"/>
+            </a:schemeClr>
+          </a:lnRef>
+          <a:fillRef idx="1">
+            <a:schemeClr val="accent1"/>
+          </a:fillRef>
+          <a:effectRef idx="0">
+            <a:schemeClr val="accent1"/>
+          </a:effectRef>
+          <a:fontRef idx="minor">
+            <a:schemeClr val="lt1"/>
+          </a:fontRef>
+        </p:style>
+        <p:txBody>
+          <a:bodyPr rtlCol="0" anchor="ctr"/>
+          <a:lstStyle/>
+          <a:p>
+            <a:pPr algn="ctr"/>
+            <a:endParaRPr lang="en-US"/>
+          </a:p>
+        </p:txBody>
+      </p:sp>
+    </p:spTree>
+    <p:extLst>
+      <p:ext uri="{BB962C8B-B14F-4D97-AF65-F5344CB8AC3E}">
+        <p14:creationId xmlns:p14="http://schemas.microsoft.com/office/powerpoint/2010/main" val="198456417"/>
+      </p:ext>
+    </p:extLst>
+  </p:cSld>
+  <p:clrMapOvr>
+    <a:masterClrMapping/>
+  </p:clrMapOvr>
+  <mc:AlternateContent xmlns:mc="http://schemas.openxmlformats.org/markup-compatibility/2006">
+    <mc:Choice xmlns:p14="http://schemas.microsoft.com/office/powerpoint/2010/main" Requires="p14">
+      <p:transition spd="med" p14:dur="700">
+        <p:fade/>
+      </p:transition>
+    </mc:Choice>
+    <mc:Fallback>
+      <p:transition spd="med">
+        <p:fade/>
+      </p:transition>
+    </mc:Fallback>
+  </mc:AlternateContent>
 </p:sld>
 </file>
 

</xml_diff>